<commit_message>
Adding midterm in algorithms
</commit_message>
<xml_diff>
--- a/src/site/data-structures/slides/cpp01-helloworld.pptx
+++ b/src/site/data-structures/slides/cpp01-helloworld.pptx
@@ -14584,19 +14584,7 @@
             </a:pPr>
             <a:r>
               <a:rPr lang="lv-LV" altLang="lv-LV" dirty="0"/>
-              <a:t>1.2. Expressions, </a:t>
-            </a:r>
-            <a:r>
-              <a:rPr lang="lv-LV" altLang="lv-LV"/>
-              <a:t>control </a:t>
-            </a:r>
-            <a:r>
-              <a:rPr lang="lv-LV" altLang="lv-LV" smtClean="0"/>
-              <a:t>statements, </a:t>
-            </a:r>
-            <a:r>
-              <a:rPr lang="lv-LV" altLang="lv-LV" dirty="0"/>
-              <a:t>functions.</a:t>
+              <a:t>1.2. Expressions, control statements, functions</a:t>
             </a:r>
           </a:p>
           <a:p>
@@ -14605,7 +14593,7 @@
             </a:pPr>
             <a:r>
               <a:rPr lang="lv-LV" altLang="lv-LV" dirty="0"/>
-              <a:t>1.3. C++ classes.</a:t>
+              <a:t>1.3. C++ classes</a:t>
             </a:r>
           </a:p>
           <a:p>
@@ -14614,27 +14602,12 @@
             </a:pPr>
             <a:r>
               <a:rPr lang="lv-LV" altLang="lv-LV" dirty="0"/>
-              <a:t>1.4. Multi-file programs.</a:t>
-            </a:r>
-          </a:p>
-          <a:p>
-            <a:pPr marL="457200" indent="-914400">
-              <a:buNone/>
-            </a:pPr>
-            <a:r>
-              <a:rPr lang="lv-LV" altLang="lv-LV" dirty="0"/>
-              <a:t>1.5. Object orientation.</a:t>
-            </a:r>
-          </a:p>
-          <a:p>
-            <a:pPr marL="457200" indent="-914400">
-              <a:buNone/>
-            </a:pPr>
-            <a:r>
-              <a:rPr lang="lv-LV" altLang="lv-LV" dirty="0"/>
-              <a:t>1.6. C++ memory model. </a:t>
-            </a:r>
-            <a:endParaRPr lang="en-US" altLang="lv-LV" dirty="0"/>
+              <a:t>1.4. </a:t>
+            </a:r>
+            <a:r>
+              <a:rPr lang="en-US" altLang="lv-LV" dirty="0"/>
+              <a:t>Arrays, pointers, references</a:t>
+            </a:r>
           </a:p>
           <a:p>
             <a:pPr marL="0" indent="0">

</xml_diff>